<commit_message>
split slide 7/added Patient Portal info
</commit_message>
<xml_diff>
--- a/Topic.Presentation.pptx
+++ b/Topic.Presentation.pptx
@@ -12,7 +12,8 @@
     <p:sldId id="259" r:id="rId6"/>
     <p:sldId id="261" r:id="rId7"/>
     <p:sldId id="262" r:id="rId8"/>
-    <p:sldId id="264" r:id="rId9"/>
+    <p:sldId id="266" r:id="rId9"/>
+    <p:sldId id="264" r:id="rId10"/>
   </p:sldIdLst>
   <p:sldSz cx="12192000" cy="6858000"/>
   <p:notesSz cx="6858000" cy="9144000"/>
@@ -842,7 +843,7 @@
             <a:fld id="{B61BEF0D-F0BB-DE4B-95CE-6DB70DBA9567}" type="datetimeFigureOut">
               <a:rPr lang="en-US" dirty="0"/>
               <a:pPr/>
-              <a:t>2/19/2016</a:t>
+              <a:t>2/20/2016</a:t>
             </a:fld>
             <a:endParaRPr lang="en-US" dirty="0"/>
           </a:p>
@@ -1090,7 +1091,7 @@
             <a:fld id="{B61BEF0D-F0BB-DE4B-95CE-6DB70DBA9567}" type="datetimeFigureOut">
               <a:rPr lang="en-US" dirty="0"/>
               <a:pPr/>
-              <a:t>2/19/2016</a:t>
+              <a:t>2/20/2016</a:t>
             </a:fld>
             <a:endParaRPr lang="en-US" dirty="0"/>
           </a:p>
@@ -1401,7 +1402,7 @@
             <a:fld id="{B61BEF0D-F0BB-DE4B-95CE-6DB70DBA9567}" type="datetimeFigureOut">
               <a:rPr lang="en-US" dirty="0"/>
               <a:pPr/>
-              <a:t>2/19/2016</a:t>
+              <a:t>2/20/2016</a:t>
             </a:fld>
             <a:endParaRPr lang="en-US" dirty="0"/>
           </a:p>
@@ -1739,7 +1740,7 @@
             <a:fld id="{B61BEF0D-F0BB-DE4B-95CE-6DB70DBA9567}" type="datetimeFigureOut">
               <a:rPr lang="en-US" dirty="0"/>
               <a:pPr/>
-              <a:t>2/19/2016</a:t>
+              <a:t>2/20/2016</a:t>
             </a:fld>
             <a:endParaRPr lang="en-US" dirty="0"/>
           </a:p>
@@ -2050,7 +2051,7 @@
             <a:fld id="{B61BEF0D-F0BB-DE4B-95CE-6DB70DBA9567}" type="datetimeFigureOut">
               <a:rPr lang="en-US" dirty="0"/>
               <a:pPr/>
-              <a:t>2/19/2016</a:t>
+              <a:t>2/20/2016</a:t>
             </a:fld>
             <a:endParaRPr lang="en-US" dirty="0"/>
           </a:p>
@@ -2440,7 +2441,7 @@
             <a:fld id="{B61BEF0D-F0BB-DE4B-95CE-6DB70DBA9567}" type="datetimeFigureOut">
               <a:rPr lang="en-US" dirty="0"/>
               <a:pPr/>
-              <a:t>2/19/2016</a:t>
+              <a:t>2/20/2016</a:t>
             </a:fld>
             <a:endParaRPr lang="en-US" dirty="0"/>
           </a:p>
@@ -2606,7 +2607,7 @@
           <a:p>
             <a:fld id="{55C6B4A9-1611-4792-9094-5F34BCA07E0B}" type="datetimeFigureOut">
               <a:rPr lang="en-US" dirty="0"/>
-              <a:t>2/19/2016</a:t>
+              <a:t>2/20/2016</a:t>
             </a:fld>
             <a:endParaRPr lang="en-US" dirty="0"/>
           </a:p>
@@ -2782,7 +2783,7 @@
             <a:fld id="{B61BEF0D-F0BB-DE4B-95CE-6DB70DBA9567}" type="datetimeFigureOut">
               <a:rPr lang="en-US" dirty="0"/>
               <a:pPr/>
-              <a:t>2/19/2016</a:t>
+              <a:t>2/20/2016</a:t>
             </a:fld>
             <a:endParaRPr lang="en-US" dirty="0"/>
           </a:p>
@@ -2955,7 +2956,7 @@
             <a:fld id="{B61BEF0D-F0BB-DE4B-95CE-6DB70DBA9567}" type="datetimeFigureOut">
               <a:rPr lang="en-US" dirty="0"/>
               <a:pPr/>
-              <a:t>2/19/2016</a:t>
+              <a:t>2/20/2016</a:t>
             </a:fld>
             <a:endParaRPr lang="en-US" dirty="0"/>
           </a:p>
@@ -3199,7 +3200,7 @@
             <a:fld id="{B61BEF0D-F0BB-DE4B-95CE-6DB70DBA9567}" type="datetimeFigureOut">
               <a:rPr lang="en-US" dirty="0"/>
               <a:pPr/>
-              <a:t>2/19/2016</a:t>
+              <a:t>2/20/2016</a:t>
             </a:fld>
             <a:endParaRPr lang="en-US" dirty="0"/>
           </a:p>
@@ -3427,7 +3428,7 @@
           <a:p>
             <a:fld id="{EB712588-04B1-427B-82EE-E8DB90309F08}" type="datetimeFigureOut">
               <a:rPr lang="en-US" dirty="0"/>
-              <a:t>2/19/2016</a:t>
+              <a:t>2/20/2016</a:t>
             </a:fld>
             <a:endParaRPr lang="en-US" dirty="0"/>
           </a:p>
@@ -3797,7 +3798,7 @@
             <a:fld id="{B61BEF0D-F0BB-DE4B-95CE-6DB70DBA9567}" type="datetimeFigureOut">
               <a:rPr lang="en-US" dirty="0"/>
               <a:pPr/>
-              <a:t>2/19/2016</a:t>
+              <a:t>2/20/2016</a:t>
             </a:fld>
             <a:endParaRPr lang="en-US" dirty="0"/>
           </a:p>
@@ -3917,7 +3918,7 @@
             <a:fld id="{B61BEF0D-F0BB-DE4B-95CE-6DB70DBA9567}" type="datetimeFigureOut">
               <a:rPr lang="en-US" dirty="0"/>
               <a:pPr/>
-              <a:t>2/19/2016</a:t>
+              <a:t>2/20/2016</a:t>
             </a:fld>
             <a:endParaRPr lang="en-US" dirty="0"/>
           </a:p>
@@ -4009,7 +4010,7 @@
             <a:fld id="{B61BEF0D-F0BB-DE4B-95CE-6DB70DBA9567}" type="datetimeFigureOut">
               <a:rPr lang="en-US" dirty="0"/>
               <a:pPr/>
-              <a:t>2/19/2016</a:t>
+              <a:t>2/20/2016</a:t>
             </a:fld>
             <a:endParaRPr lang="en-US" dirty="0"/>
           </a:p>
@@ -4260,7 +4261,7 @@
           <a:p>
             <a:fld id="{42A54C80-263E-416B-A8E0-580EDEADCBDC}" type="datetimeFigureOut">
               <a:rPr lang="en-US" dirty="0"/>
-              <a:t>2/19/2016</a:t>
+              <a:t>2/20/2016</a:t>
             </a:fld>
             <a:endParaRPr lang="en-US" dirty="0"/>
           </a:p>
@@ -4519,7 +4520,7 @@
             <a:fld id="{B61BEF0D-F0BB-DE4B-95CE-6DB70DBA9567}" type="datetimeFigureOut">
               <a:rPr lang="en-US" dirty="0"/>
               <a:pPr/>
-              <a:t>2/19/2016</a:t>
+              <a:t>2/20/2016</a:t>
             </a:fld>
             <a:endParaRPr lang="en-US" dirty="0"/>
           </a:p>
@@ -5259,7 +5260,7 @@
             <a:fld id="{B61BEF0D-F0BB-DE4B-95CE-6DB70DBA9567}" type="datetimeFigureOut">
               <a:rPr lang="en-US" dirty="0"/>
               <a:pPr/>
-              <a:t>2/19/2016</a:t>
+              <a:t>2/20/2016</a:t>
             </a:fld>
             <a:endParaRPr lang="en-US" dirty="0"/>
           </a:p>
@@ -6445,11 +6446,15 @@
             </a:r>
             <a:r>
               <a:rPr lang="en-US" dirty="0" smtClean="0"/>
-              <a:t>Errors </a:t>
+              <a:t>Errors (</a:t>
             </a:r>
             <a:r>
               <a:rPr lang="en-US" dirty="0" err="1" smtClean="0"/>
-              <a:t>cntd</a:t>
+              <a:t>contd</a:t>
+            </a:r>
+            <a:r>
+              <a:rPr lang="en-US" dirty="0" smtClean="0"/>
+              <a:t>)</a:t>
             </a:r>
             <a:endParaRPr lang="en-US" dirty="0"/>
           </a:p>
@@ -6852,19 +6857,19 @@
         </p:nvSpPr>
         <p:spPr>
           <a:xfrm>
-            <a:off x="677334" y="2160589"/>
-            <a:ext cx="8596668" cy="4545011"/>
+            <a:off x="677334" y="1623527"/>
+            <a:ext cx="8596668" cy="5082074"/>
           </a:xfrm>
         </p:spPr>
         <p:txBody>
           <a:bodyPr>
-            <a:normAutofit fontScale="92500"/>
+            <a:normAutofit lnSpcReduction="10000"/>
           </a:bodyPr>
           <a:lstStyle/>
           <a:p>
             <a:r>
-              <a:rPr lang="en-US" sz="2800" dirty="0" smtClean="0"/>
-              <a:t>Plugin architecture to capture treatment analysis from EHS</a:t>
+              <a:rPr lang="en-US" sz="2600" dirty="0" smtClean="0"/>
+              <a:t>Plugin architecture to capture treatment analysis from EHR</a:t>
             </a:r>
           </a:p>
           <a:p>
@@ -6875,32 +6880,123 @@
             </a:r>
           </a:p>
           <a:p>
-            <a:r>
-              <a:rPr lang="en-US" sz="2800" dirty="0" smtClean="0"/>
-              <a:t>Patient-Provider synergistic tool</a:t>
-            </a:r>
-          </a:p>
-          <a:p>
-            <a:pPr lvl="1"/>
-            <a:r>
-              <a:rPr lang="en-US" sz="2600" dirty="0" smtClean="0"/>
-              <a:t>Upon patient approval, provider can search patient’s medical history for optimal strategy</a:t>
-            </a:r>
-          </a:p>
-          <a:p>
-            <a:pPr lvl="1"/>
-            <a:r>
-              <a:rPr lang="en-US" sz="2600" dirty="0" smtClean="0"/>
-              <a:t>Patient can input data (such as food, etc.) into his “home” access</a:t>
-            </a:r>
-          </a:p>
-          <a:p>
-            <a:pPr lvl="1"/>
-            <a:r>
-              <a:rPr lang="en-US" sz="2600" dirty="0" smtClean="0"/>
-              <a:t>Patient can search warnings with plan vs. new prescriptions, over-the-counter drugs, etc.</a:t>
-            </a:r>
-            <a:endParaRPr lang="en-US" sz="2600" dirty="0"/>
+            <a:pPr lvl="0">
+              <a:buClr>
+                <a:srgbClr val="90C226"/>
+              </a:buClr>
+            </a:pPr>
+            <a:r>
+              <a:rPr lang="en-US" sz="2600" dirty="0">
+                <a:solidFill>
+                  <a:prstClr val="black">
+                    <a:lumMod val="75000"/>
+                    <a:lumOff val="25000"/>
+                  </a:prstClr>
+                </a:solidFill>
+              </a:rPr>
+              <a:t>Patient Portal</a:t>
+            </a:r>
+          </a:p>
+          <a:p>
+            <a:pPr marL="742950" lvl="2" indent="-342900">
+              <a:buClr>
+                <a:srgbClr val="90C226"/>
+              </a:buClr>
+            </a:pPr>
+            <a:r>
+              <a:rPr lang="en-US" sz="2600" dirty="0">
+                <a:solidFill>
+                  <a:prstClr val="black">
+                    <a:lumMod val="75000"/>
+                    <a:lumOff val="25000"/>
+                  </a:prstClr>
+                </a:solidFill>
+              </a:rPr>
+              <a:t>Attach EHR to allow patient to enter relevant data (such as allergy information)</a:t>
+            </a:r>
+          </a:p>
+          <a:p>
+            <a:pPr lvl="1">
+              <a:buClr>
+                <a:srgbClr val="90C226"/>
+              </a:buClr>
+            </a:pPr>
+            <a:r>
+              <a:rPr lang="en-US" sz="2600" dirty="0">
+                <a:solidFill>
+                  <a:prstClr val="black">
+                    <a:lumMod val="75000"/>
+                    <a:lumOff val="25000"/>
+                  </a:prstClr>
+                </a:solidFill>
+              </a:rPr>
+              <a:t>Leverage commonly-used technology with extent APIs  to integrate data from applications </a:t>
+            </a:r>
+            <a:r>
+              <a:rPr lang="en-US" sz="2600" dirty="0" smtClean="0">
+                <a:solidFill>
+                  <a:prstClr val="black">
+                    <a:lumMod val="75000"/>
+                    <a:lumOff val="25000"/>
+                  </a:prstClr>
+                </a:solidFill>
+              </a:rPr>
+              <a:t>(such </a:t>
+            </a:r>
+            <a:r>
+              <a:rPr lang="en-US" sz="2600" dirty="0">
+                <a:solidFill>
+                  <a:prstClr val="black">
+                    <a:lumMod val="75000"/>
+                    <a:lumOff val="25000"/>
+                  </a:prstClr>
+                </a:solidFill>
+              </a:rPr>
+              <a:t>as </a:t>
+            </a:r>
+            <a:r>
+              <a:rPr lang="en-US" sz="2600" dirty="0" smtClean="0">
+                <a:solidFill>
+                  <a:prstClr val="black">
+                    <a:lumMod val="75000"/>
+                    <a:lumOff val="25000"/>
+                  </a:prstClr>
+                </a:solidFill>
+              </a:rPr>
+              <a:t>MyFitnessPal etc.)</a:t>
+            </a:r>
+          </a:p>
+          <a:p>
+            <a:pPr lvl="1">
+              <a:buClr>
+                <a:srgbClr val="90C226"/>
+              </a:buClr>
+            </a:pPr>
+            <a:r>
+              <a:rPr lang="en-US" sz="2600" dirty="0" smtClean="0">
+                <a:solidFill>
+                  <a:prstClr val="black">
+                    <a:lumMod val="75000"/>
+                    <a:lumOff val="25000"/>
+                  </a:prstClr>
+                </a:solidFill>
+              </a:rPr>
+              <a:t>Integrated data can be continually updated</a:t>
+            </a:r>
+            <a:endParaRPr lang="en-US" sz="2600" dirty="0">
+              <a:solidFill>
+                <a:prstClr val="black">
+                  <a:lumMod val="75000"/>
+                  <a:lumOff val="25000"/>
+                </a:prstClr>
+              </a:solidFill>
+            </a:endParaRPr>
+          </a:p>
+          <a:p>
+            <a:pPr marL="457200" lvl="1" indent="0">
+              <a:buNone/>
+            </a:pPr>
+            <a:endParaRPr lang="en-US" sz="2400" dirty="0" smtClean="0"/>
           </a:p>
         </p:txBody>
       </p:sp>
@@ -6925,6 +7021,186 @@
 </file>
 
 <file path=ppt/slides/slide8.xml><?xml version="1.0" encoding="utf-8"?>
+<p:sld xmlns:a="http://schemas.openxmlformats.org/drawingml/2006/main" xmlns:r="http://schemas.openxmlformats.org/officeDocument/2006/relationships" xmlns:p="http://schemas.openxmlformats.org/presentationml/2006/main">
+  <p:cSld>
+    <p:spTree>
+      <p:nvGrpSpPr>
+        <p:cNvPr id="1" name=""/>
+        <p:cNvGrpSpPr/>
+        <p:nvPr/>
+      </p:nvGrpSpPr>
+      <p:grpSpPr>
+        <a:xfrm>
+          <a:off x="0" y="0"/>
+          <a:ext cx="0" cy="0"/>
+          <a:chOff x="0" y="0"/>
+          <a:chExt cx="0" cy="0"/>
+        </a:xfrm>
+      </p:grpSpPr>
+      <p:sp>
+        <p:nvSpPr>
+          <p:cNvPr id="2" name="Title 1"/>
+          <p:cNvSpPr>
+            <a:spLocks noGrp="1"/>
+          </p:cNvSpPr>
+          <p:nvPr>
+            <p:ph type="title"/>
+          </p:nvPr>
+        </p:nvSpPr>
+        <p:spPr/>
+        <p:txBody>
+          <a:bodyPr/>
+          <a:lstStyle/>
+          <a:p>
+            <a:r>
+              <a:rPr lang="en-US" dirty="0" smtClean="0"/>
+              <a:t>Our Solution (</a:t>
+            </a:r>
+            <a:r>
+              <a:rPr lang="en-US" dirty="0" err="1" smtClean="0"/>
+              <a:t>contd</a:t>
+            </a:r>
+            <a:r>
+              <a:rPr lang="en-US" dirty="0" smtClean="0"/>
+              <a:t>)</a:t>
+            </a:r>
+            <a:endParaRPr lang="en-US" dirty="0"/>
+          </a:p>
+        </p:txBody>
+      </p:sp>
+      <p:sp>
+        <p:nvSpPr>
+          <p:cNvPr id="3" name="Content Placeholder 2"/>
+          <p:cNvSpPr>
+            <a:spLocks noGrp="1"/>
+          </p:cNvSpPr>
+          <p:nvPr>
+            <p:ph idx="1"/>
+          </p:nvPr>
+        </p:nvSpPr>
+        <p:spPr>
+          <a:xfrm>
+            <a:off x="677334" y="1576873"/>
+            <a:ext cx="8596668" cy="5128727"/>
+          </a:xfrm>
+        </p:spPr>
+        <p:txBody>
+          <a:bodyPr>
+            <a:normAutofit/>
+          </a:bodyPr>
+          <a:lstStyle/>
+          <a:p>
+            <a:pPr lvl="0">
+              <a:buClr>
+                <a:srgbClr val="90C226"/>
+              </a:buClr>
+            </a:pPr>
+            <a:r>
+              <a:rPr lang="en-US" sz="2600" dirty="0" smtClean="0">
+                <a:solidFill>
+                  <a:prstClr val="black">
+                    <a:lumMod val="75000"/>
+                    <a:lumOff val="25000"/>
+                  </a:prstClr>
+                </a:solidFill>
+              </a:rPr>
+              <a:t>Patient-Provider </a:t>
+            </a:r>
+            <a:r>
+              <a:rPr lang="en-US" sz="2600" dirty="0">
+                <a:solidFill>
+                  <a:prstClr val="black">
+                    <a:lumMod val="75000"/>
+                    <a:lumOff val="25000"/>
+                  </a:prstClr>
+                </a:solidFill>
+              </a:rPr>
+              <a:t>synergistic tool</a:t>
+            </a:r>
+          </a:p>
+          <a:p>
+            <a:pPr lvl="1">
+              <a:buClr>
+                <a:srgbClr val="90C226"/>
+              </a:buClr>
+            </a:pPr>
+            <a:r>
+              <a:rPr lang="en-US" sz="2600" dirty="0">
+                <a:solidFill>
+                  <a:prstClr val="black">
+                    <a:lumMod val="75000"/>
+                    <a:lumOff val="25000"/>
+                  </a:prstClr>
+                </a:solidFill>
+              </a:rPr>
+              <a:t>Upon patient approval, provider can search patient’s medical history for optimal strategy</a:t>
+            </a:r>
+          </a:p>
+          <a:p>
+            <a:pPr lvl="1">
+              <a:buClr>
+                <a:srgbClr val="90C226"/>
+              </a:buClr>
+            </a:pPr>
+            <a:r>
+              <a:rPr lang="en-US" sz="2600" dirty="0">
+                <a:solidFill>
+                  <a:prstClr val="black">
+                    <a:lumMod val="75000"/>
+                    <a:lumOff val="25000"/>
+                  </a:prstClr>
+                </a:solidFill>
+              </a:rPr>
+              <a:t>Patient can input data (such as food, etc.) into his “home” access</a:t>
+            </a:r>
+          </a:p>
+          <a:p>
+            <a:pPr lvl="1">
+              <a:buClr>
+                <a:srgbClr val="90C226"/>
+              </a:buClr>
+            </a:pPr>
+            <a:r>
+              <a:rPr lang="en-US" sz="2600" dirty="0">
+                <a:solidFill>
+                  <a:prstClr val="black">
+                    <a:lumMod val="75000"/>
+                    <a:lumOff val="25000"/>
+                  </a:prstClr>
+                </a:solidFill>
+              </a:rPr>
+              <a:t>Patient can search warnings with plan vs. new prescriptions, over-the-counter drugs, etc.</a:t>
+            </a:r>
+          </a:p>
+          <a:p>
+            <a:pPr marL="0" indent="0">
+              <a:buNone/>
+            </a:pPr>
+            <a:endParaRPr lang="en-US" sz="2600" dirty="0"/>
+          </a:p>
+        </p:txBody>
+      </p:sp>
+    </p:spTree>
+    <p:extLst>
+      <p:ext uri="{BB962C8B-B14F-4D97-AF65-F5344CB8AC3E}">
+        <p14:creationId xmlns:p14="http://schemas.microsoft.com/office/powerpoint/2010/main" val="39984732"/>
+      </p:ext>
+    </p:extLst>
+  </p:cSld>
+  <p:clrMapOvr>
+    <a:masterClrMapping/>
+  </p:clrMapOvr>
+  <p:timing>
+    <p:tnLst>
+      <p:par>
+        <p:cTn id="1" dur="indefinite" restart="never" nodeType="tmRoot"/>
+      </p:par>
+    </p:tnLst>
+  </p:timing>
+</p:sld>
+</file>
+
+<file path=ppt/slides/slide9.xml><?xml version="1.0" encoding="utf-8"?>
 <p:sld xmlns:a="http://schemas.openxmlformats.org/drawingml/2006/main" xmlns:r="http://schemas.openxmlformats.org/officeDocument/2006/relationships" xmlns:p="http://schemas.openxmlformats.org/presentationml/2006/main">
   <p:cSld>
     <p:spTree>

</xml_diff>

<commit_message>
removed extra space on slide 7
</commit_message>
<xml_diff>
--- a/Topic.Presentation.pptx
+++ b/Topic.Presentation.pptx
@@ -6952,7 +6952,29 @@
                   </a:prstClr>
                 </a:solidFill>
               </a:rPr>
-              <a:t>APIs  to integrate data from applications </a:t>
+              <a:t>APIs </a:t>
+            </a:r>
+            <a:r>
+              <a:rPr lang="en-US" sz="2600" dirty="0" smtClean="0">
+                <a:solidFill>
+                  <a:prstClr val="black">
+                    <a:lumMod val="75000"/>
+                    <a:lumOff val="25000"/>
+                  </a:prstClr>
+                </a:solidFill>
+              </a:rPr>
+              <a:t>to </a:t>
+            </a:r>
+            <a:r>
+              <a:rPr lang="en-US" sz="2600" dirty="0">
+                <a:solidFill>
+                  <a:prstClr val="black">
+                    <a:lumMod val="75000"/>
+                    <a:lumOff val="25000"/>
+                  </a:prstClr>
+                </a:solidFill>
+              </a:rPr>
+              <a:t>integrate data from applications </a:t>
             </a:r>
             <a:r>
               <a:rPr lang="en-US" sz="2600" dirty="0" smtClean="0">
@@ -6985,8 +7007,38 @@
                   </a:prstClr>
                 </a:solidFill>
               </a:rPr>
-              <a:t>MyFitnessPal etc.)</a:t>
-            </a:r>
+              <a:t>MyFitnessPal </a:t>
+            </a:r>
+            <a:r>
+              <a:rPr lang="en-US" sz="2600" smtClean="0">
+                <a:solidFill>
+                  <a:prstClr val="black">
+                    <a:lumMod val="75000"/>
+                    <a:lumOff val="25000"/>
+                  </a:prstClr>
+                </a:solidFill>
+              </a:rPr>
+              <a:t>etc</a:t>
+            </a:r>
+            <a:r>
+              <a:rPr lang="en-US" sz="2600" smtClean="0">
+                <a:solidFill>
+                  <a:prstClr val="black">
+                    <a:lumMod val="75000"/>
+                    <a:lumOff val="25000"/>
+                  </a:prstClr>
+                </a:solidFill>
+              </a:rPr>
+              <a:t>.) </a:t>
+            </a:r>
+            <a:endParaRPr lang="en-US" sz="2600" dirty="0" smtClean="0">
+              <a:solidFill>
+                <a:prstClr val="black">
+                  <a:lumMod val="75000"/>
+                  <a:lumOff val="25000"/>
+                </a:prstClr>
+              </a:solidFill>
+            </a:endParaRPr>
           </a:p>
           <a:p>
             <a:pPr lvl="1">

</xml_diff>